<commit_message>
segregated the cpp files
</commit_message>
<xml_diff>
--- a/Progress Presentation/SPL Progress.pptx
+++ b/Progress Presentation/SPL Progress.pptx
@@ -264,7 +264,7 @@
           <a:p>
             <a:fld id="{E065068A-6F9B-4592-BBE8-24B7074613BF}" type="datetimeFigureOut">
               <a:rPr lang="en-US" smtClean="0"/>
-              <a:t>11/5/2024</a:t>
+              <a:t>11/6/2024</a:t>
             </a:fld>
             <a:endParaRPr lang="en-US"/>
           </a:p>
@@ -795,7 +795,7 @@
             <a:fld id="{1D8BD707-D9CF-40AE-B4C6-C98DA3205C09}" type="datetimeFigureOut">
               <a:rPr lang="en-US" smtClean="0"/>
               <a:pPr/>
-              <a:t>11/5/2024</a:t>
+              <a:t>11/6/2024</a:t>
             </a:fld>
             <a:endParaRPr lang="en-US"/>
           </a:p>
@@ -960,7 +960,7 @@
             <a:fld id="{1D8BD707-D9CF-40AE-B4C6-C98DA3205C09}" type="datetimeFigureOut">
               <a:rPr lang="en-US" smtClean="0"/>
               <a:pPr/>
-              <a:t>11/5/2024</a:t>
+              <a:t>11/6/2024</a:t>
             </a:fld>
             <a:endParaRPr lang="en-US"/>
           </a:p>
@@ -1135,7 +1135,7 @@
             <a:fld id="{1D8BD707-D9CF-40AE-B4C6-C98DA3205C09}" type="datetimeFigureOut">
               <a:rPr lang="en-US" smtClean="0"/>
               <a:pPr/>
-              <a:t>11/5/2024</a:t>
+              <a:t>11/6/2024</a:t>
             </a:fld>
             <a:endParaRPr lang="en-US"/>
           </a:p>
@@ -1300,7 +1300,7 @@
             <a:fld id="{1D8BD707-D9CF-40AE-B4C6-C98DA3205C09}" type="datetimeFigureOut">
               <a:rPr lang="en-US" smtClean="0"/>
               <a:pPr/>
-              <a:t>11/5/2024</a:t>
+              <a:t>11/6/2024</a:t>
             </a:fld>
             <a:endParaRPr lang="en-US"/>
           </a:p>
@@ -1542,7 +1542,7 @@
             <a:fld id="{1D8BD707-D9CF-40AE-B4C6-C98DA3205C09}" type="datetimeFigureOut">
               <a:rPr lang="en-US" smtClean="0"/>
               <a:pPr/>
-              <a:t>11/5/2024</a:t>
+              <a:t>11/6/2024</a:t>
             </a:fld>
             <a:endParaRPr lang="en-US"/>
           </a:p>
@@ -1824,7 +1824,7 @@
             <a:fld id="{1D8BD707-D9CF-40AE-B4C6-C98DA3205C09}" type="datetimeFigureOut">
               <a:rPr lang="en-US" smtClean="0"/>
               <a:pPr/>
-              <a:t>11/5/2024</a:t>
+              <a:t>11/6/2024</a:t>
             </a:fld>
             <a:endParaRPr lang="en-US"/>
           </a:p>
@@ -2240,7 +2240,7 @@
             <a:fld id="{1D8BD707-D9CF-40AE-B4C6-C98DA3205C09}" type="datetimeFigureOut">
               <a:rPr lang="en-US" smtClean="0"/>
               <a:pPr/>
-              <a:t>11/5/2024</a:t>
+              <a:t>11/6/2024</a:t>
             </a:fld>
             <a:endParaRPr lang="en-US"/>
           </a:p>
@@ -2354,7 +2354,7 @@
             <a:fld id="{1D8BD707-D9CF-40AE-B4C6-C98DA3205C09}" type="datetimeFigureOut">
               <a:rPr lang="en-US" smtClean="0"/>
               <a:pPr/>
-              <a:t>11/5/2024</a:t>
+              <a:t>11/6/2024</a:t>
             </a:fld>
             <a:endParaRPr lang="en-US"/>
           </a:p>
@@ -2446,7 +2446,7 @@
             <a:fld id="{1D8BD707-D9CF-40AE-B4C6-C98DA3205C09}" type="datetimeFigureOut">
               <a:rPr lang="en-US" smtClean="0"/>
               <a:pPr/>
-              <a:t>11/5/2024</a:t>
+              <a:t>11/6/2024</a:t>
             </a:fld>
             <a:endParaRPr lang="en-US"/>
           </a:p>
@@ -2718,7 +2718,7 @@
             <a:fld id="{1D8BD707-D9CF-40AE-B4C6-C98DA3205C09}" type="datetimeFigureOut">
               <a:rPr lang="en-US" smtClean="0"/>
               <a:pPr/>
-              <a:t>11/5/2024</a:t>
+              <a:t>11/6/2024</a:t>
             </a:fld>
             <a:endParaRPr lang="en-US"/>
           </a:p>
@@ -2967,7 +2967,7 @@
             <a:fld id="{1D8BD707-D9CF-40AE-B4C6-C98DA3205C09}" type="datetimeFigureOut">
               <a:rPr lang="en-US" smtClean="0"/>
               <a:pPr/>
-              <a:t>11/5/2024</a:t>
+              <a:t>11/6/2024</a:t>
             </a:fld>
             <a:endParaRPr lang="en-US"/>
           </a:p>
@@ -3175,7 +3175,7 @@
             <a:fld id="{1D8BD707-D9CF-40AE-B4C6-C98DA3205C09}" type="datetimeFigureOut">
               <a:rPr lang="en-US" smtClean="0"/>
               <a:pPr/>
-              <a:t>11/5/2024</a:t>
+              <a:t>11/6/2024</a:t>
             </a:fld>
             <a:endParaRPr lang="en-US"/>
           </a:p>
@@ -3853,7 +3853,7 @@
         </p:nvSpPr>
         <p:spPr>
           <a:xfrm>
-            <a:off x="-667710" y="6989658"/>
+            <a:off x="-666493" y="6972300"/>
             <a:ext cx="2647750" cy="2647750"/>
           </a:xfrm>
           <a:custGeom>
@@ -7682,8 +7682,8 @@
         </p:nvGrpSpPr>
         <p:grpSpPr>
           <a:xfrm>
-            <a:off x="4402844" y="8462069"/>
-            <a:ext cx="938367" cy="957385"/>
+            <a:off x="4457078" y="8071001"/>
+            <a:ext cx="873523" cy="777038"/>
             <a:chOff x="0" y="0"/>
             <a:chExt cx="812800" cy="829273"/>
           </a:xfrm>
@@ -7764,7 +7764,7 @@
                 </a:lnSpc>
               </a:pPr>
               <a:r>
-                <a:rPr lang="en-US" sz="3999" spc="119">
+                <a:rPr lang="en-US" sz="3999" spc="119" dirty="0">
                   <a:solidFill>
                     <a:srgbClr val="FFFFFF"/>
                   </a:solidFill>
@@ -8116,7 +8116,7 @@
               </a:lnSpc>
             </a:pPr>
             <a:r>
-              <a:rPr lang="en-US" sz="2824" spc="84">
+              <a:rPr lang="en-US" sz="2824" spc="84" dirty="0">
                 <a:solidFill>
                   <a:srgbClr val="FFFFFF"/>
                 </a:solidFill>
@@ -8125,8 +8125,29 @@
                 <a:cs typeface="Aileron"/>
                 <a:sym typeface="Aileron"/>
               </a:rPr>
-              <a:t>Print Recipt</a:t>
-            </a:r>
+              <a:t>Print </a:t>
+            </a:r>
+            <a:r>
+              <a:rPr lang="en-US" sz="2824" spc="84" dirty="0" err="1">
+                <a:solidFill>
+                  <a:srgbClr val="FFFFFF"/>
+                </a:solidFill>
+                <a:latin typeface="Aileron"/>
+                <a:ea typeface="Aileron"/>
+                <a:cs typeface="Aileron"/>
+                <a:sym typeface="Aileron"/>
+              </a:rPr>
+              <a:t>Recipt</a:t>
+            </a:r>
+            <a:endParaRPr lang="en-US" sz="2824" spc="84" dirty="0">
+              <a:solidFill>
+                <a:srgbClr val="FFFFFF"/>
+              </a:solidFill>
+              <a:latin typeface="Aileron"/>
+              <a:ea typeface="Aileron"/>
+              <a:cs typeface="Aileron"/>
+              <a:sym typeface="Aileron"/>
+            </a:endParaRPr>
           </a:p>
         </p:txBody>
       </p:sp>
@@ -8214,63 +8235,6 @@
       </p:sp>
       <p:sp>
         <p:nvSpPr>
-          <p:cNvPr id="40" name="TextBox 40"/>
-          <p:cNvSpPr txBox="1"/>
-          <p:nvPr/>
-        </p:nvSpPr>
-        <p:spPr>
-          <a:xfrm>
-            <a:off x="5554835" y="8579516"/>
-            <a:ext cx="4026175" cy="1252792"/>
-          </a:xfrm>
-          <a:prstGeom prst="rect">
-            <a:avLst/>
-          </a:prstGeom>
-        </p:spPr>
-        <p:txBody>
-          <a:bodyPr lIns="0" tIns="0" rIns="0" bIns="0" rtlCol="0" anchor="t">
-            <a:spAutoFit/>
-          </a:bodyPr>
-          <a:lstStyle/>
-          <a:p>
-            <a:pPr algn="l">
-              <a:lnSpc>
-                <a:spcPts val="5052"/>
-              </a:lnSpc>
-            </a:pPr>
-            <a:r>
-              <a:rPr lang="en-US" sz="3368" b="1" spc="101">
-                <a:solidFill>
-                  <a:srgbClr val="FFFFFF"/>
-                </a:solidFill>
-                <a:latin typeface="Aileron Bold"/>
-                <a:ea typeface="Aileron Bold"/>
-                <a:cs typeface="Aileron Bold"/>
-                <a:sym typeface="Aileron Bold"/>
-              </a:rPr>
-              <a:t>Selling trends.</a:t>
-            </a:r>
-          </a:p>
-          <a:p>
-            <a:pPr algn="l">
-              <a:lnSpc>
-                <a:spcPts val="5052"/>
-              </a:lnSpc>
-            </a:pPr>
-            <a:endParaRPr lang="en-US" sz="3368" b="1" spc="101">
-              <a:solidFill>
-                <a:srgbClr val="FFFFFF"/>
-              </a:solidFill>
-              <a:latin typeface="Aileron Bold"/>
-              <a:ea typeface="Aileron Bold"/>
-              <a:cs typeface="Aileron Bold"/>
-              <a:sym typeface="Aileron Bold"/>
-            </a:endParaRPr>
-          </a:p>
-        </p:txBody>
-      </p:sp>
-      <p:sp>
-        <p:nvSpPr>
           <p:cNvPr id="41" name="TextBox 41"/>
           <p:cNvSpPr txBox="1"/>
           <p:nvPr/>
@@ -8307,6 +8271,244 @@
               </a:rPr>
               <a:t>Automated Stock Reduction</a:t>
             </a:r>
+          </a:p>
+        </p:txBody>
+      </p:sp>
+      <p:grpSp>
+        <p:nvGrpSpPr>
+          <p:cNvPr id="42" name="Group 26">
+            <a:extLst>
+              <a:ext uri="{FF2B5EF4-FFF2-40B4-BE49-F238E27FC236}">
+                <a16:creationId xmlns:a16="http://schemas.microsoft.com/office/drawing/2014/main" id="{DDB60E4B-4B85-457A-B4AD-A09788B06EEE}"/>
+              </a:ext>
+            </a:extLst>
+          </p:cNvPr>
+          <p:cNvGrpSpPr/>
+          <p:nvPr/>
+        </p:nvGrpSpPr>
+        <p:grpSpPr>
+          <a:xfrm>
+            <a:off x="4407140" y="9318805"/>
+            <a:ext cx="873523" cy="777038"/>
+            <a:chOff x="0" y="0"/>
+            <a:chExt cx="812800" cy="829273"/>
+          </a:xfrm>
+        </p:grpSpPr>
+        <p:sp>
+          <p:nvSpPr>
+            <p:cNvPr id="43" name="Freeform 27">
+              <a:extLst>
+                <a:ext uri="{FF2B5EF4-FFF2-40B4-BE49-F238E27FC236}">
+                  <a16:creationId xmlns:a16="http://schemas.microsoft.com/office/drawing/2014/main" id="{5FFCEC58-6D74-4795-8423-C3610A75FFF6}"/>
+                </a:ext>
+              </a:extLst>
+            </p:cNvPr>
+            <p:cNvSpPr/>
+            <p:nvPr/>
+          </p:nvSpPr>
+          <p:spPr>
+            <a:xfrm>
+              <a:off x="0" y="0"/>
+              <a:ext cx="812800" cy="829273"/>
+            </a:xfrm>
+            <a:custGeom>
+              <a:avLst/>
+              <a:gdLst/>
+              <a:ahLst/>
+              <a:cxnLst/>
+              <a:rect l="l" t="t" r="r" b="b"/>
+              <a:pathLst>
+                <a:path w="812800" h="829273">
+                  <a:moveTo>
+                    <a:pt x="406400" y="0"/>
+                  </a:moveTo>
+                  <a:cubicBezTo>
+                    <a:pt x="181951" y="0"/>
+                    <a:pt x="0" y="185639"/>
+                    <a:pt x="0" y="414636"/>
+                  </a:cubicBezTo>
+                  <a:cubicBezTo>
+                    <a:pt x="0" y="643634"/>
+                    <a:pt x="181951" y="829273"/>
+                    <a:pt x="406400" y="829273"/>
+                  </a:cubicBezTo>
+                  <a:cubicBezTo>
+                    <a:pt x="630849" y="829273"/>
+                    <a:pt x="812800" y="643634"/>
+                    <a:pt x="812800" y="414636"/>
+                  </a:cubicBezTo>
+                  <a:cubicBezTo>
+                    <a:pt x="812800" y="185639"/>
+                    <a:pt x="630849" y="0"/>
+                    <a:pt x="406400" y="0"/>
+                  </a:cubicBezTo>
+                  <a:close/>
+                </a:path>
+              </a:pathLst>
+            </a:custGeom>
+            <a:solidFill>
+              <a:srgbClr val="2C92D5"/>
+            </a:solidFill>
+          </p:spPr>
+        </p:sp>
+        <p:sp>
+          <p:nvSpPr>
+            <p:cNvPr id="44" name="TextBox 28">
+              <a:extLst>
+                <a:ext uri="{FF2B5EF4-FFF2-40B4-BE49-F238E27FC236}">
+                  <a16:creationId xmlns:a16="http://schemas.microsoft.com/office/drawing/2014/main" id="{4DB8EFD9-0ADB-4B9E-8F56-17EAE2D723A7}"/>
+                </a:ext>
+              </a:extLst>
+            </p:cNvPr>
+            <p:cNvSpPr txBox="1"/>
+            <p:nvPr/>
+          </p:nvSpPr>
+          <p:spPr>
+            <a:xfrm>
+              <a:off x="76200" y="-36556"/>
+              <a:ext cx="660400" cy="788084"/>
+            </a:xfrm>
+            <a:prstGeom prst="rect">
+              <a:avLst/>
+            </a:prstGeom>
+          </p:spPr>
+          <p:txBody>
+            <a:bodyPr lIns="50800" tIns="50800" rIns="50800" bIns="50800" rtlCol="0" anchor="ctr"/>
+            <a:lstStyle/>
+            <a:p>
+              <a:pPr algn="ctr">
+                <a:lnSpc>
+                  <a:spcPts val="5999"/>
+                </a:lnSpc>
+              </a:pPr>
+              <a:r>
+                <a:rPr lang="en-US" sz="3999" spc="119" dirty="0">
+                  <a:solidFill>
+                    <a:srgbClr val="FFFFFF"/>
+                  </a:solidFill>
+                  <a:latin typeface="Aileron"/>
+                  <a:ea typeface="Aileron"/>
+                  <a:cs typeface="Aileron"/>
+                  <a:sym typeface="Aileron"/>
+                </a:rPr>
+                <a:t>*</a:t>
+              </a:r>
+            </a:p>
+          </p:txBody>
+        </p:sp>
+      </p:grpSp>
+      <p:sp>
+        <p:nvSpPr>
+          <p:cNvPr id="48" name="TextBox 37">
+            <a:extLst>
+              <a:ext uri="{FF2B5EF4-FFF2-40B4-BE49-F238E27FC236}">
+                <a16:creationId xmlns:a16="http://schemas.microsoft.com/office/drawing/2014/main" id="{EAF0E808-4B77-48BB-AACA-22BBBF7EF11C}"/>
+              </a:ext>
+            </a:extLst>
+          </p:cNvPr>
+          <p:cNvSpPr txBox="1"/>
+          <p:nvPr/>
+        </p:nvSpPr>
+        <p:spPr>
+          <a:xfrm>
+            <a:off x="5639783" y="8196583"/>
+            <a:ext cx="3781580" cy="498342"/>
+          </a:xfrm>
+          <a:prstGeom prst="rect">
+            <a:avLst/>
+          </a:prstGeom>
+        </p:spPr>
+        <p:txBody>
+          <a:bodyPr wrap="square" lIns="0" tIns="0" rIns="0" bIns="0" rtlCol="0" anchor="t">
+            <a:spAutoFit/>
+          </a:bodyPr>
+          <a:lstStyle/>
+          <a:p>
+            <a:pPr algn="l">
+              <a:lnSpc>
+                <a:spcPts val="4236"/>
+              </a:lnSpc>
+            </a:pPr>
+            <a:r>
+              <a:rPr lang="en-US" sz="2824" spc="84" dirty="0">
+                <a:solidFill>
+                  <a:srgbClr val="FFFFFF"/>
+                </a:solidFill>
+                <a:latin typeface="Aileron"/>
+                <a:ea typeface="Aileron"/>
+                <a:cs typeface="Aileron"/>
+                <a:sym typeface="Aileron"/>
+              </a:rPr>
+              <a:t>Selling </a:t>
+            </a:r>
+            <a:r>
+              <a:rPr lang="en-US" sz="3200" spc="84" dirty="0">
+                <a:solidFill>
+                  <a:srgbClr val="FFFFFF"/>
+                </a:solidFill>
+                <a:latin typeface="Aileron"/>
+                <a:ea typeface="Aileron"/>
+                <a:cs typeface="Aileron"/>
+                <a:sym typeface="Aileron"/>
+              </a:rPr>
+              <a:t>Trends</a:t>
+            </a:r>
+          </a:p>
+        </p:txBody>
+      </p:sp>
+      <p:sp>
+        <p:nvSpPr>
+          <p:cNvPr id="49" name="TextBox 37">
+            <a:extLst>
+              <a:ext uri="{FF2B5EF4-FFF2-40B4-BE49-F238E27FC236}">
+                <a16:creationId xmlns:a16="http://schemas.microsoft.com/office/drawing/2014/main" id="{BA047CFA-0558-4108-BE05-5883D51A629B}"/>
+              </a:ext>
+            </a:extLst>
+          </p:cNvPr>
+          <p:cNvSpPr txBox="1"/>
+          <p:nvPr/>
+        </p:nvSpPr>
+        <p:spPr>
+          <a:xfrm>
+            <a:off x="5657010" y="9421874"/>
+            <a:ext cx="3781580" cy="498342"/>
+          </a:xfrm>
+          <a:prstGeom prst="rect">
+            <a:avLst/>
+          </a:prstGeom>
+        </p:spPr>
+        <p:txBody>
+          <a:bodyPr wrap="square" lIns="0" tIns="0" rIns="0" bIns="0" rtlCol="0" anchor="t">
+            <a:spAutoFit/>
+          </a:bodyPr>
+          <a:lstStyle/>
+          <a:p>
+            <a:pPr algn="l">
+              <a:lnSpc>
+                <a:spcPts val="4236"/>
+              </a:lnSpc>
+            </a:pPr>
+            <a:r>
+              <a:rPr lang="en-US" sz="2824" spc="84" dirty="0">
+                <a:solidFill>
+                  <a:srgbClr val="FFFFFF"/>
+                </a:solidFill>
+                <a:latin typeface="Aileron"/>
+                <a:ea typeface="Aileron"/>
+                <a:cs typeface="Aileron"/>
+                <a:sym typeface="Aileron"/>
+              </a:rPr>
+              <a:t>Supplier Rating</a:t>
+            </a:r>
+            <a:endParaRPr lang="en-US" sz="3200" spc="84" dirty="0">
+              <a:solidFill>
+                <a:srgbClr val="FFFFFF"/>
+              </a:solidFill>
+              <a:latin typeface="Aileron"/>
+              <a:ea typeface="Aileron"/>
+              <a:cs typeface="Aileron"/>
+              <a:sym typeface="Aileron"/>
+            </a:endParaRPr>
           </a:p>
         </p:txBody>
       </p:sp>

</xml_diff>